<commit_message>
Mybatis + Spring boot demo
</commit_message>
<xml_diff>
--- a/Doc/开题答辩/开题答辩.pptx
+++ b/Doc/开题答辩/开题答辩.pptx
@@ -270,7 +270,7 @@
           <a:p>
             <a:fld id="{E3E0DB73-7033-42B0-BD02-C54A0BE77918}" type="datetimeFigureOut">
               <a:rPr lang="bg-BG" smtClean="0"/>
-              <a:t>26.11.17 г.</a:t>
+              <a:t>27.11.17 г.</a:t>
             </a:fld>
             <a:endParaRPr lang="bg-BG"/>
           </a:p>
@@ -435,7 +435,7 @@
           <a:p>
             <a:fld id="{5C546879-6C1C-4702-A461-34B635ED35B4}" type="datetimeFigureOut">
               <a:rPr lang="bg-BG" smtClean="0"/>
-              <a:t>26.11.17 г.</a:t>
+              <a:t>27.11.17 г.</a:t>
             </a:fld>
             <a:endParaRPr lang="bg-BG"/>
           </a:p>
@@ -15471,10 +15471,10 @@
               <a:defRPr/>
             </a:pPr>
             <a:r>
-              <a:rPr lang="fr-FR" smtClean="0">
+              <a:rPr lang="en-US" dirty="0" smtClean="0">
                 <a:latin typeface="New Cicle" pitchFamily="2" charset="0"/>
               </a:rPr>
-              <a:t>Collaboration</a:t>
+              <a:t>Teamwork tools</a:t>
             </a:r>
             <a:endParaRPr lang="bg-BG" dirty="0" smtClean="0"/>
           </a:p>

</xml_diff>